<commit_message>
ADDED: More details about the hands-on project
</commit_message>
<xml_diff>
--- a/Hands-On/Hands-On.pptx
+++ b/Hands-On/Hands-On.pptx
@@ -6,10 +6,13 @@
   </p:sldMasterIdLst>
   <p:sldIdLst>
     <p:sldId id="256" r:id="rId2"/>
-    <p:sldId id="260" r:id="rId3"/>
-    <p:sldId id="257" r:id="rId4"/>
-    <p:sldId id="258" r:id="rId5"/>
-    <p:sldId id="259" r:id="rId6"/>
+    <p:sldId id="261" r:id="rId3"/>
+    <p:sldId id="262" r:id="rId4"/>
+    <p:sldId id="263" r:id="rId5"/>
+    <p:sldId id="260" r:id="rId6"/>
+    <p:sldId id="257" r:id="rId7"/>
+    <p:sldId id="258" r:id="rId8"/>
+    <p:sldId id="259" r:id="rId9"/>
   </p:sldIdLst>
   <p:sldSz cx="9144000" cy="6858000" type="screen4x3"/>
   <p:notesSz cx="6858000" cy="9144000"/>
@@ -1923,7 +1926,7 @@
           <a:p>
             <a:fld id="{1BA50D42-C9CD-4801-B293-61D1F53EC57E}" type="datetimeFigureOut">
               <a:rPr lang="de-DE" smtClean="0"/>
-              <a:t>31.05.2016</a:t>
+              <a:t>06.06.2016</a:t>
             </a:fld>
             <a:endParaRPr lang="de-DE"/>
           </a:p>
@@ -2104,7 +2107,7 @@
           <a:p>
             <a:fld id="{1BA50D42-C9CD-4801-B293-61D1F53EC57E}" type="datetimeFigureOut">
               <a:rPr lang="de-DE" smtClean="0"/>
-              <a:t>31.05.2016</a:t>
+              <a:t>06.06.2016</a:t>
             </a:fld>
             <a:endParaRPr lang="de-DE"/>
           </a:p>
@@ -2255,7 +2258,7 @@
           <a:p>
             <a:fld id="{1BA50D42-C9CD-4801-B293-61D1F53EC57E}" type="datetimeFigureOut">
               <a:rPr lang="de-DE" smtClean="0"/>
-              <a:t>31.05.2016</a:t>
+              <a:t>06.06.2016</a:t>
             </a:fld>
             <a:endParaRPr lang="de-DE"/>
           </a:p>
@@ -4081,7 +4084,7 @@
           <a:p>
             <a:fld id="{1BA50D42-C9CD-4801-B293-61D1F53EC57E}" type="datetimeFigureOut">
               <a:rPr lang="de-DE" smtClean="0"/>
-              <a:t>31.05.2016</a:t>
+              <a:t>06.06.2016</a:t>
             </a:fld>
             <a:endParaRPr lang="de-DE"/>
           </a:p>
@@ -5951,7 +5954,7 @@
           <a:p>
             <a:fld id="{1BA50D42-C9CD-4801-B293-61D1F53EC57E}" type="datetimeFigureOut">
               <a:rPr lang="de-DE" smtClean="0"/>
-              <a:t>31.05.2016</a:t>
+              <a:t>06.06.2016</a:t>
             </a:fld>
             <a:endParaRPr lang="de-DE"/>
           </a:p>
@@ -6064,7 +6067,7 @@
           <a:p>
             <a:fld id="{1BA50D42-C9CD-4801-B293-61D1F53EC57E}" type="datetimeFigureOut">
               <a:rPr lang="de-DE" smtClean="0"/>
-              <a:t>31.05.2016</a:t>
+              <a:t>06.06.2016</a:t>
             </a:fld>
             <a:endParaRPr lang="de-DE"/>
           </a:p>
@@ -6605,7 +6608,7 @@
           <a:p>
             <a:fld id="{1BA50D42-C9CD-4801-B293-61D1F53EC57E}" type="datetimeFigureOut">
               <a:rPr lang="de-DE" smtClean="0"/>
-              <a:t>31.05.2016</a:t>
+              <a:t>06.06.2016</a:t>
             </a:fld>
             <a:endParaRPr lang="de-DE"/>
           </a:p>
@@ -6718,7 +6721,7 @@
           <a:p>
             <a:fld id="{1BA50D42-C9CD-4801-B293-61D1F53EC57E}" type="datetimeFigureOut">
               <a:rPr lang="de-DE" smtClean="0"/>
-              <a:t>31.05.2016</a:t>
+              <a:t>06.06.2016</a:t>
             </a:fld>
             <a:endParaRPr lang="de-DE"/>
           </a:p>
@@ -8429,7 +8432,7 @@
           <a:p>
             <a:fld id="{1BA50D42-C9CD-4801-B293-61D1F53EC57E}" type="datetimeFigureOut">
               <a:rPr lang="de-DE" smtClean="0"/>
-              <a:t>31.05.2016</a:t>
+              <a:t>06.06.2016</a:t>
             </a:fld>
             <a:endParaRPr lang="de-DE"/>
           </a:p>
@@ -8580,7 +8583,7 @@
           <a:p>
             <a:fld id="{1BA50D42-C9CD-4801-B293-61D1F53EC57E}" type="datetimeFigureOut">
               <a:rPr lang="de-DE" smtClean="0"/>
-              <a:t>31.05.2016</a:t>
+              <a:t>06.06.2016</a:t>
             </a:fld>
             <a:endParaRPr lang="de-DE"/>
           </a:p>
@@ -12195,7 +12198,7 @@
           <a:p>
             <a:fld id="{1BA50D42-C9CD-4801-B293-61D1F53EC57E}" type="datetimeFigureOut">
               <a:rPr lang="de-DE" smtClean="0"/>
-              <a:t>31.05.2016</a:t>
+              <a:t>06.06.2016</a:t>
             </a:fld>
             <a:endParaRPr lang="de-DE"/>
           </a:p>
@@ -14054,7 +14057,7 @@
           <a:p>
             <a:fld id="{1BA50D42-C9CD-4801-B293-61D1F53EC57E}" type="datetimeFigureOut">
               <a:rPr lang="de-DE" smtClean="0"/>
-              <a:t>31.05.2016</a:t>
+              <a:t>06.06.2016</a:t>
             </a:fld>
             <a:endParaRPr lang="de-DE"/>
           </a:p>
@@ -14663,7 +14666,35 @@
           <a:p>
             <a:r>
               <a:rPr lang="de-DE" dirty="0" smtClean="0"/>
-              <a:t>Check out </a:t>
+              <a:t>The </a:t>
+            </a:r>
+            <a:r>
+              <a:rPr lang="de-DE" dirty="0" err="1" smtClean="0"/>
+              <a:t>program</a:t>
+            </a:r>
+            <a:r>
+              <a:rPr lang="de-DE" dirty="0" smtClean="0"/>
+              <a:t> </a:t>
+            </a:r>
+            <a:r>
+              <a:rPr lang="de-DE" dirty="0" err="1" smtClean="0"/>
+              <a:t>you</a:t>
+            </a:r>
+            <a:r>
+              <a:rPr lang="de-DE" dirty="0"/>
+              <a:t> </a:t>
+            </a:r>
+            <a:r>
+              <a:rPr lang="de-DE" dirty="0" smtClean="0"/>
+              <a:t>will </a:t>
+            </a:r>
+            <a:r>
+              <a:rPr lang="de-DE" dirty="0" err="1" smtClean="0"/>
+              <a:t>checkout</a:t>
+            </a:r>
+            <a:r>
+              <a:rPr lang="de-DE" dirty="0" smtClean="0"/>
+              <a:t> in </a:t>
             </a:r>
             <a:r>
               <a:rPr lang="de-DE" dirty="0" err="1" smtClean="0"/>
@@ -14671,7 +14702,211 @@
             </a:r>
             <a:r>
               <a:rPr lang="de-DE" dirty="0" smtClean="0"/>
-              <a:t> Hands-On Project!</a:t>
+              <a:t> </a:t>
+            </a:r>
+            <a:r>
+              <a:rPr lang="de-DE" dirty="0" err="1" smtClean="0"/>
+              <a:t>next</a:t>
+            </a:r>
+            <a:r>
+              <a:rPr lang="de-DE" dirty="0" smtClean="0"/>
+              <a:t> </a:t>
+            </a:r>
+            <a:r>
+              <a:rPr lang="de-DE" dirty="0" err="1" smtClean="0"/>
+              <a:t>step</a:t>
+            </a:r>
+            <a:r>
+              <a:rPr lang="de-DE" dirty="0" smtClean="0"/>
+              <a:t>, </a:t>
+            </a:r>
+            <a:r>
+              <a:rPr lang="de-DE" dirty="0" err="1" smtClean="0"/>
+              <a:t>is</a:t>
+            </a:r>
+            <a:r>
+              <a:rPr lang="de-DE" dirty="0" smtClean="0"/>
+              <a:t> a simple </a:t>
+            </a:r>
+            <a:r>
+              <a:rPr lang="de-DE" dirty="0" err="1" smtClean="0"/>
+              <a:t>application</a:t>
+            </a:r>
+            <a:r>
+              <a:rPr lang="de-DE" dirty="0"/>
+              <a:t> </a:t>
+            </a:r>
+            <a:r>
+              <a:rPr lang="de-DE" dirty="0" err="1" smtClean="0"/>
+              <a:t>which</a:t>
+            </a:r>
+            <a:r>
+              <a:rPr lang="de-DE" dirty="0" smtClean="0"/>
+              <a:t> </a:t>
+            </a:r>
+            <a:r>
+              <a:rPr lang="de-DE" dirty="0" err="1" smtClean="0"/>
+              <a:t>implements</a:t>
+            </a:r>
+            <a:r>
+              <a:rPr lang="de-DE" dirty="0" smtClean="0"/>
+              <a:t> a </a:t>
+            </a:r>
+            <a:r>
+              <a:rPr lang="de-DE" dirty="0" err="1" smtClean="0"/>
+              <a:t>button</a:t>
+            </a:r>
+            <a:r>
+              <a:rPr lang="de-DE" dirty="0" smtClean="0"/>
+              <a:t> </a:t>
+            </a:r>
+            <a:r>
+              <a:rPr lang="de-DE" dirty="0" err="1" smtClean="0"/>
+              <a:t>and</a:t>
+            </a:r>
+            <a:r>
+              <a:rPr lang="de-DE" dirty="0" smtClean="0"/>
+              <a:t> a </a:t>
+            </a:r>
+            <a:r>
+              <a:rPr lang="de-DE" dirty="0" err="1" smtClean="0"/>
+              <a:t>counter</a:t>
+            </a:r>
+            <a:r>
+              <a:rPr lang="de-DE" dirty="0" smtClean="0"/>
+              <a:t>. </a:t>
+            </a:r>
+          </a:p>
+          <a:p>
+            <a:r>
+              <a:rPr lang="de-DE" dirty="0" err="1" smtClean="0"/>
+              <a:t>When</a:t>
+            </a:r>
+            <a:r>
+              <a:rPr lang="de-DE" dirty="0" smtClean="0"/>
+              <a:t> </a:t>
+            </a:r>
+            <a:r>
+              <a:rPr lang="de-DE" dirty="0" err="1" smtClean="0"/>
+              <a:t>the</a:t>
+            </a:r>
+            <a:r>
+              <a:rPr lang="de-DE" dirty="0" smtClean="0"/>
+              <a:t> </a:t>
+            </a:r>
+            <a:r>
+              <a:rPr lang="de-DE" dirty="0" err="1" smtClean="0"/>
+              <a:t>button</a:t>
+            </a:r>
+            <a:r>
+              <a:rPr lang="de-DE" dirty="0" smtClean="0"/>
+              <a:t> </a:t>
+            </a:r>
+            <a:r>
+              <a:rPr lang="de-DE" dirty="0" err="1" smtClean="0"/>
+              <a:t>gets</a:t>
+            </a:r>
+            <a:r>
+              <a:rPr lang="de-DE" dirty="0" smtClean="0"/>
+              <a:t> </a:t>
+            </a:r>
+            <a:r>
+              <a:rPr lang="de-DE" dirty="0" err="1" smtClean="0"/>
+              <a:t>hit</a:t>
+            </a:r>
+            <a:r>
+              <a:rPr lang="de-DE" dirty="0" smtClean="0"/>
+              <a:t> </a:t>
+            </a:r>
+            <a:r>
+              <a:rPr lang="de-DE" dirty="0" err="1" smtClean="0"/>
+              <a:t>the</a:t>
+            </a:r>
+            <a:r>
+              <a:rPr lang="de-DE" dirty="0" smtClean="0"/>
+              <a:t> </a:t>
+            </a:r>
+            <a:r>
+              <a:rPr lang="de-DE" dirty="0" err="1" smtClean="0"/>
+              <a:t>counter</a:t>
+            </a:r>
+            <a:r>
+              <a:rPr lang="de-DE" dirty="0" smtClean="0"/>
+              <a:t> </a:t>
+            </a:r>
+            <a:r>
+              <a:rPr lang="de-DE" dirty="0" err="1" smtClean="0"/>
+              <a:t>get</a:t>
+            </a:r>
+            <a:r>
+              <a:rPr lang="de-DE" dirty="0" smtClean="0"/>
+              <a:t> </a:t>
+            </a:r>
+            <a:r>
+              <a:rPr lang="de-DE" dirty="0" err="1" smtClean="0"/>
+              <a:t>incremented</a:t>
+            </a:r>
+            <a:r>
+              <a:rPr lang="de-DE" dirty="0" smtClean="0"/>
+              <a:t> </a:t>
+            </a:r>
+          </a:p>
+          <a:p>
+            <a:r>
+              <a:rPr lang="de-DE" dirty="0" smtClean="0"/>
+              <a:t>The </a:t>
+            </a:r>
+            <a:r>
+              <a:rPr lang="de-DE" dirty="0" err="1" smtClean="0"/>
+              <a:t>current</a:t>
+            </a:r>
+            <a:r>
+              <a:rPr lang="de-DE" dirty="0" smtClean="0"/>
+              <a:t> </a:t>
+            </a:r>
+            <a:r>
+              <a:rPr lang="de-DE" dirty="0" err="1" smtClean="0"/>
+              <a:t>counter</a:t>
+            </a:r>
+            <a:r>
+              <a:rPr lang="de-DE" dirty="0" smtClean="0"/>
+              <a:t> </a:t>
+            </a:r>
+            <a:r>
+              <a:rPr lang="de-DE" dirty="0" err="1" smtClean="0"/>
+              <a:t>value</a:t>
+            </a:r>
+            <a:r>
+              <a:rPr lang="de-DE" dirty="0" smtClean="0"/>
+              <a:t> </a:t>
+            </a:r>
+            <a:r>
+              <a:rPr lang="de-DE" dirty="0" err="1" smtClean="0"/>
+              <a:t>get</a:t>
+            </a:r>
+            <a:r>
+              <a:rPr lang="de-DE" dirty="0" smtClean="0"/>
+              <a:t> </a:t>
+            </a:r>
+            <a:r>
+              <a:rPr lang="de-DE" dirty="0" err="1" smtClean="0"/>
+              <a:t>displayed</a:t>
+            </a:r>
+            <a:r>
+              <a:rPr lang="de-DE" dirty="0" smtClean="0"/>
+              <a:t> on </a:t>
+            </a:r>
+            <a:r>
+              <a:rPr lang="de-DE" dirty="0" err="1" smtClean="0"/>
+              <a:t>the</a:t>
+            </a:r>
+            <a:r>
+              <a:rPr lang="de-DE" dirty="0" smtClean="0"/>
+              <a:t> </a:t>
+            </a:r>
+            <a:r>
+              <a:rPr lang="de-DE" dirty="0" err="1" smtClean="0"/>
+              <a:t>button</a:t>
             </a:r>
             <a:endParaRPr lang="de-DE" dirty="0"/>
           </a:p>
@@ -14693,8 +14928,36 @@
           <a:lstStyle/>
           <a:p>
             <a:r>
+              <a:rPr lang="de-DE" dirty="0" err="1" smtClean="0"/>
+              <a:t>What</a:t>
+            </a:r>
+            <a:r>
               <a:rPr lang="de-DE" dirty="0" smtClean="0"/>
-              <a:t>Hands-On</a:t>
+              <a:t> </a:t>
+            </a:r>
+            <a:r>
+              <a:rPr lang="de-DE" dirty="0" err="1" smtClean="0"/>
+              <a:t>does</a:t>
+            </a:r>
+            <a:r>
+              <a:rPr lang="de-DE" dirty="0" smtClean="0"/>
+              <a:t> </a:t>
+            </a:r>
+            <a:r>
+              <a:rPr lang="de-DE" dirty="0" err="1" smtClean="0"/>
+              <a:t>the</a:t>
+            </a:r>
+            <a:r>
+              <a:rPr lang="de-DE" dirty="0" smtClean="0"/>
+              <a:t> </a:t>
+            </a:r>
+            <a:r>
+              <a:rPr lang="de-DE" dirty="0" err="1" smtClean="0"/>
+              <a:t>program</a:t>
+            </a:r>
+            <a:r>
+              <a:rPr lang="de-DE" dirty="0" smtClean="0"/>
+              <a:t>?</a:t>
             </a:r>
             <a:endParaRPr lang="de-DE" dirty="0"/>
           </a:p>
@@ -14703,7 +14966,7 @@
     </p:spTree>
     <p:extLst>
       <p:ext uri="{BB962C8B-B14F-4D97-AF65-F5344CB8AC3E}">
-        <p14:creationId xmlns:p14="http://schemas.microsoft.com/office/powerpoint/2010/main" val="2317268262"/>
+        <p14:creationId xmlns:p14="http://schemas.microsoft.com/office/powerpoint/2010/main" val="1822340181"/>
       </p:ext>
     </p:extLst>
   </p:cSld>
@@ -14747,48 +15010,91 @@
           <a:p>
             <a:r>
               <a:rPr lang="de-DE" dirty="0" err="1" smtClean="0"/>
-              <a:t>MainActivity.cs</a:t>
+              <a:t>Initializes</a:t>
             </a:r>
             <a:r>
               <a:rPr lang="de-DE" dirty="0" smtClean="0"/>
               <a:t> </a:t>
             </a:r>
             <a:r>
-              <a:rPr lang="de-DE" dirty="0" smtClean="0">
-                <a:sym typeface="Wingdings" panose="05000000000000000000" pitchFamily="2" charset="2"/>
-              </a:rPr>
-              <a:t> </a:t>
-            </a:r>
-            <a:r>
-              <a:rPr lang="de-DE" dirty="0" err="1" smtClean="0">
-                <a:sym typeface="Wingdings" panose="05000000000000000000" pitchFamily="2" charset="2"/>
-              </a:rPr>
-              <a:t>OnCreate</a:t>
-            </a:r>
-            <a:r>
-              <a:rPr lang="de-DE" dirty="0" smtClean="0">
-                <a:sym typeface="Wingdings" panose="05000000000000000000" pitchFamily="2" charset="2"/>
-              </a:rPr>
-              <a:t> (Bundle </a:t>
-            </a:r>
-            <a:r>
-              <a:rPr lang="de-DE" dirty="0" err="1" smtClean="0">
-                <a:sym typeface="Wingdings" panose="05000000000000000000" pitchFamily="2" charset="2"/>
-              </a:rPr>
-              <a:t>bundle</a:t>
-            </a:r>
-            <a:r>
-              <a:rPr lang="de-DE" dirty="0" smtClean="0">
-                <a:sym typeface="Wingdings" panose="05000000000000000000" pitchFamily="2" charset="2"/>
-              </a:rPr>
-              <a:t>)</a:t>
-            </a:r>
-          </a:p>
-          <a:p>
-            <a:pPr lvl="1"/>
+              <a:rPr lang="de-DE" dirty="0" err="1" smtClean="0"/>
+              <a:t>the</a:t>
+            </a:r>
             <a:r>
               <a:rPr lang="de-DE" dirty="0" smtClean="0"/>
-              <a:t>Initialize </a:t>
+              <a:t> </a:t>
+            </a:r>
+            <a:r>
+              <a:rPr lang="de-DE" dirty="0" err="1" smtClean="0"/>
+              <a:t>first</a:t>
+            </a:r>
+            <a:r>
+              <a:rPr lang="de-DE" dirty="0" smtClean="0"/>
+              <a:t> </a:t>
+            </a:r>
+            <a:r>
+              <a:rPr lang="de-DE" dirty="0" err="1" smtClean="0"/>
+              <a:t>screen</a:t>
+            </a:r>
+            <a:r>
+              <a:rPr lang="de-DE" dirty="0" smtClean="0"/>
+              <a:t> </a:t>
+            </a:r>
+            <a:r>
+              <a:rPr lang="de-DE" dirty="0" err="1" smtClean="0"/>
+              <a:t>you</a:t>
+            </a:r>
+            <a:r>
+              <a:rPr lang="de-DE" dirty="0" smtClean="0"/>
+              <a:t> </a:t>
+            </a:r>
+            <a:r>
+              <a:rPr lang="de-DE" dirty="0" err="1" smtClean="0"/>
+              <a:t>see</a:t>
+            </a:r>
+            <a:r>
+              <a:rPr lang="de-DE" dirty="0" smtClean="0"/>
+              <a:t> </a:t>
+            </a:r>
+            <a:r>
+              <a:rPr lang="de-DE" dirty="0" err="1" smtClean="0"/>
+              <a:t>when</a:t>
+            </a:r>
+            <a:r>
+              <a:rPr lang="de-DE" dirty="0" smtClean="0"/>
+              <a:t> </a:t>
+            </a:r>
+            <a:r>
+              <a:rPr lang="de-DE" dirty="0" err="1" smtClean="0"/>
+              <a:t>you</a:t>
+            </a:r>
+            <a:r>
+              <a:rPr lang="de-DE" dirty="0" smtClean="0"/>
+              <a:t> </a:t>
+            </a:r>
+            <a:r>
+              <a:rPr lang="de-DE" dirty="0" err="1" smtClean="0"/>
+              <a:t>start</a:t>
+            </a:r>
+            <a:r>
+              <a:rPr lang="de-DE" dirty="0" smtClean="0"/>
+              <a:t> </a:t>
+            </a:r>
+            <a:r>
+              <a:rPr lang="de-DE" dirty="0" err="1" smtClean="0"/>
+              <a:t>the</a:t>
+            </a:r>
+            <a:r>
+              <a:rPr lang="de-DE" dirty="0" smtClean="0"/>
+              <a:t> </a:t>
+            </a:r>
+            <a:r>
+              <a:rPr lang="de-DE" dirty="0" err="1" smtClean="0"/>
+              <a:t>application</a:t>
+            </a:r>
+            <a:r>
+              <a:rPr lang="de-DE" dirty="0" smtClean="0"/>
+              <a:t> on </a:t>
             </a:r>
             <a:r>
               <a:rPr lang="de-DE" dirty="0" err="1" smtClean="0"/>
@@ -14796,129 +15102,28 @@
             </a:r>
             <a:r>
               <a:rPr lang="de-DE" dirty="0" smtClean="0"/>
-              <a:t> </a:t>
+              <a:t> mobile </a:t>
             </a:r>
             <a:r>
               <a:rPr lang="de-DE" dirty="0" err="1" smtClean="0"/>
-              <a:t>activity</a:t>
-            </a:r>
-            <a:endParaRPr lang="de-DE" dirty="0" smtClean="0"/>
-          </a:p>
-          <a:p>
-            <a:pPr lvl="2"/>
-            <a:r>
-              <a:rPr lang="de-DE" dirty="0" err="1"/>
-              <a:t>base.OnCreate</a:t>
-            </a:r>
-            <a:r>
-              <a:rPr lang="de-DE" dirty="0"/>
-              <a:t>(</a:t>
-            </a:r>
-            <a:r>
-              <a:rPr lang="de-DE" dirty="0" err="1"/>
-              <a:t>bundle</a:t>
-            </a:r>
-            <a:r>
-              <a:rPr lang="de-DE" dirty="0"/>
-              <a:t>);</a:t>
-            </a:r>
-            <a:r>
-              <a:rPr lang="de-DE" dirty="0"/>
-              <a:t> </a:t>
-            </a:r>
-          </a:p>
-          <a:p>
-            <a:pPr lvl="1"/>
-            <a:r>
-              <a:rPr lang="de-DE" dirty="0" smtClean="0"/>
-              <a:t>Initialize </a:t>
-            </a:r>
-            <a:r>
-              <a:rPr lang="de-DE" dirty="0" err="1" smtClean="0"/>
-              <a:t>Xamarins.Forms</a:t>
+              <a:t>device</a:t>
             </a:r>
             <a:r>
               <a:rPr lang="de-DE" dirty="0" smtClean="0"/>
               <a:t> </a:t>
             </a:r>
-          </a:p>
-          <a:p>
-            <a:pPr lvl="2"/>
-            <a:r>
-              <a:rPr lang="de-DE" dirty="0" err="1"/>
-              <a:t>Xamarin.Forms.Forms.Init</a:t>
-            </a:r>
-            <a:r>
-              <a:rPr lang="de-DE" dirty="0"/>
-              <a:t>(</a:t>
-            </a:r>
-            <a:r>
-              <a:rPr lang="de-DE" dirty="0" err="1"/>
-              <a:t>this</a:t>
-            </a:r>
-            <a:r>
-              <a:rPr lang="de-DE" dirty="0"/>
-              <a:t>, </a:t>
-            </a:r>
-            <a:r>
-              <a:rPr lang="de-DE" dirty="0" err="1"/>
-              <a:t>bundle</a:t>
-            </a:r>
-            <a:r>
-              <a:rPr lang="de-DE" dirty="0"/>
-              <a:t>);</a:t>
-            </a:r>
-            <a:r>
-              <a:rPr lang="de-DE" dirty="0"/>
-              <a:t> </a:t>
-            </a:r>
-            <a:endParaRPr lang="de-DE" dirty="0" smtClean="0"/>
-          </a:p>
-          <a:p>
-            <a:pPr lvl="1"/>
+            <a:r>
+              <a:rPr lang="de-DE" dirty="0" err="1" smtClean="0"/>
+              <a:t>or</a:t>
+            </a:r>
             <a:r>
               <a:rPr lang="de-DE" dirty="0" smtClean="0"/>
-              <a:t>Initialize </a:t>
+              <a:t> in a </a:t>
             </a:r>
             <a:r>
               <a:rPr lang="de-DE" dirty="0" err="1" smtClean="0"/>
-              <a:t>your</a:t>
-            </a:r>
-            <a:r>
-              <a:rPr lang="de-DE" dirty="0" smtClean="0"/>
-              <a:t> Android </a:t>
-            </a:r>
-            <a:r>
-              <a:rPr lang="de-DE" dirty="0" err="1" smtClean="0"/>
-              <a:t>Application</a:t>
-            </a:r>
-            <a:endParaRPr lang="de-DE" dirty="0"/>
-          </a:p>
-          <a:p>
-            <a:pPr lvl="2"/>
-            <a:r>
-              <a:rPr lang="de-DE" dirty="0" err="1" smtClean="0"/>
-              <a:t>LoadApplication</a:t>
-            </a:r>
-            <a:r>
-              <a:rPr lang="de-DE" dirty="0" smtClean="0"/>
-              <a:t>(</a:t>
-            </a:r>
-            <a:r>
-              <a:rPr lang="de-DE" dirty="0" err="1" smtClean="0"/>
-              <a:t>new</a:t>
-            </a:r>
-            <a:r>
-              <a:rPr lang="de-DE" dirty="0"/>
-              <a:t> App());</a:t>
-            </a:r>
-            <a:br>
-              <a:rPr lang="de-DE" dirty="0"/>
-            </a:br>
-            <a:endParaRPr lang="de-DE" dirty="0" smtClean="0"/>
-          </a:p>
-          <a:p>
-            <a:pPr lvl="1"/>
+              <a:t>simulator</a:t>
+            </a:r>
             <a:endParaRPr lang="de-DE" dirty="0"/>
           </a:p>
         </p:txBody>
@@ -14939,8 +15144,8 @@
           <a:lstStyle/>
           <a:p>
             <a:r>
-              <a:rPr lang="de-DE" dirty="0" smtClean="0"/>
-              <a:t>Hands-On</a:t>
+              <a:rPr lang="de-DE" dirty="0" err="1" smtClean="0"/>
+              <a:t>MainActivity.cs</a:t>
             </a:r>
             <a:endParaRPr lang="de-DE" dirty="0"/>
           </a:p>
@@ -14949,7 +15154,7 @@
     </p:spTree>
     <p:extLst>
       <p:ext uri="{BB962C8B-B14F-4D97-AF65-F5344CB8AC3E}">
-        <p14:creationId xmlns:p14="http://schemas.microsoft.com/office/powerpoint/2010/main" val="3757485771"/>
+        <p14:creationId xmlns:p14="http://schemas.microsoft.com/office/powerpoint/2010/main" val="2463828880"/>
       </p:ext>
     </p:extLst>
   </p:cSld>
@@ -14992,24 +15197,71 @@
           <a:lstStyle/>
           <a:p>
             <a:r>
+              <a:rPr lang="de-DE" dirty="0" smtClean="0"/>
+              <a:t>This </a:t>
+            </a:r>
+            <a:r>
               <a:rPr lang="de-DE" dirty="0" err="1" smtClean="0"/>
-              <a:t>ButtonCodePage.cs</a:t>
+              <a:t>class</a:t>
+            </a:r>
+            <a:r>
+              <a:rPr lang="de-DE" dirty="0" smtClean="0"/>
+              <a:t> </a:t>
+            </a:r>
+            <a:r>
+              <a:rPr lang="de-DE" dirty="0" err="1" smtClean="0"/>
+              <a:t>handles</a:t>
+            </a:r>
+            <a:r>
+              <a:rPr lang="de-DE" dirty="0" smtClean="0"/>
+              <a:t> </a:t>
+            </a:r>
+            <a:r>
+              <a:rPr lang="de-DE" dirty="0" err="1" smtClean="0"/>
+              <a:t>the</a:t>
+            </a:r>
+            <a:r>
+              <a:rPr lang="de-DE" dirty="0" smtClean="0"/>
+              <a:t> </a:t>
+            </a:r>
+            <a:r>
+              <a:rPr lang="de-DE" dirty="0" err="1" smtClean="0"/>
+              <a:t>logic</a:t>
+            </a:r>
+            <a:r>
+              <a:rPr lang="de-DE" dirty="0" smtClean="0"/>
+              <a:t> </a:t>
+            </a:r>
+            <a:r>
+              <a:rPr lang="de-DE" dirty="0" err="1" smtClean="0"/>
+              <a:t>for</a:t>
+            </a:r>
+            <a:r>
+              <a:rPr lang="de-DE" dirty="0" smtClean="0"/>
+              <a:t> </a:t>
+            </a:r>
+            <a:r>
+              <a:rPr lang="de-DE" dirty="0" err="1" smtClean="0"/>
+              <a:t>the</a:t>
+            </a:r>
+            <a:r>
+              <a:rPr lang="de-DE" dirty="0" smtClean="0"/>
+              <a:t> </a:t>
+            </a:r>
+            <a:r>
+              <a:rPr lang="de-DE" dirty="0" err="1" smtClean="0"/>
+              <a:t>button</a:t>
             </a:r>
             <a:endParaRPr lang="de-DE" dirty="0" smtClean="0"/>
           </a:p>
           <a:p>
-            <a:pPr lvl="1"/>
+            <a:r>
+              <a:rPr lang="de-DE" dirty="0" err="1" smtClean="0"/>
+              <a:t>Here</a:t>
+            </a:r>
             <a:r>
               <a:rPr lang="de-DE" dirty="0" smtClean="0"/>
-              <a:t>Create a Button </a:t>
-            </a:r>
-            <a:r>
-              <a:rPr lang="de-DE" dirty="0" err="1" smtClean="0"/>
-              <a:t>which</a:t>
-            </a:r>
-            <a:r>
-              <a:rPr lang="de-DE" dirty="0" smtClean="0"/>
-              <a:t> in </a:t>
+              <a:t> </a:t>
             </a:r>
             <a:r>
               <a:rPr lang="de-DE" dirty="0" err="1" smtClean="0"/>
@@ -15021,7 +15273,7 @@
             </a:r>
             <a:r>
               <a:rPr lang="de-DE" dirty="0" err="1" smtClean="0"/>
-              <a:t>next</a:t>
+              <a:t>button</a:t>
             </a:r>
             <a:r>
               <a:rPr lang="de-DE" dirty="0" smtClean="0"/>
@@ -15029,7 +15281,7 @@
             </a:r>
             <a:r>
               <a:rPr lang="de-DE" dirty="0" err="1" smtClean="0"/>
-              <a:t>step</a:t>
+              <a:t>gets</a:t>
             </a:r>
             <a:r>
               <a:rPr lang="de-DE" dirty="0" smtClean="0"/>
@@ -15037,11 +15289,27 @@
             </a:r>
             <a:r>
               <a:rPr lang="de-DE" dirty="0" err="1" smtClean="0"/>
-              <a:t>gets</a:t>
+              <a:t>initilized</a:t>
             </a:r>
             <a:r>
               <a:rPr lang="de-DE" dirty="0" smtClean="0"/>
-              <a:t> a </a:t>
+              <a:t> </a:t>
+            </a:r>
+            <a:r>
+              <a:rPr lang="de-DE" dirty="0" err="1" smtClean="0"/>
+              <a:t>and</a:t>
+            </a:r>
+            <a:r>
+              <a:rPr lang="de-DE" dirty="0" smtClean="0"/>
+              <a:t> </a:t>
+            </a:r>
+            <a:r>
+              <a:rPr lang="de-DE" dirty="0" err="1" smtClean="0"/>
+              <a:t>the</a:t>
+            </a:r>
+            <a:r>
+              <a:rPr lang="de-DE" dirty="0" smtClean="0"/>
+              <a:t> </a:t>
             </a:r>
             <a:r>
               <a:rPr lang="de-DE" dirty="0" err="1" smtClean="0"/>
@@ -15054,61 +15322,175 @@
             <a:r>
               <a:rPr lang="de-DE" dirty="0" err="1" smtClean="0"/>
               <a:t>event</a:t>
+            </a:r>
+            <a:r>
+              <a:rPr lang="de-DE" dirty="0" smtClean="0"/>
+              <a:t> </a:t>
+            </a:r>
+            <a:r>
+              <a:rPr lang="de-DE" dirty="0" err="1" smtClean="0"/>
+              <a:t>is</a:t>
+            </a:r>
+            <a:r>
+              <a:rPr lang="de-DE" dirty="0" smtClean="0"/>
+              <a:t> </a:t>
+            </a:r>
+            <a:r>
+              <a:rPr lang="de-DE" dirty="0" err="1" smtClean="0"/>
+              <a:t>here</a:t>
+            </a:r>
+            <a:r>
+              <a:rPr lang="de-DE" dirty="0" smtClean="0"/>
+              <a:t> </a:t>
+            </a:r>
+            <a:r>
+              <a:rPr lang="de-DE" dirty="0" err="1" smtClean="0"/>
+              <a:t>handled</a:t>
             </a:r>
             <a:endParaRPr lang="de-DE" dirty="0" smtClean="0"/>
           </a:p>
           <a:p>
-            <a:pPr lvl="2"/>
-            <a:r>
-              <a:rPr lang="en-US" dirty="0"/>
-              <a:t> Button </a:t>
-            </a:r>
-            <a:r>
-              <a:rPr lang="en-US" dirty="0" err="1"/>
+            <a:r>
+              <a:rPr lang="de-DE" dirty="0" err="1" smtClean="0"/>
+              <a:t>When</a:t>
+            </a:r>
+            <a:r>
+              <a:rPr lang="de-DE" dirty="0" smtClean="0"/>
+              <a:t> a </a:t>
+            </a:r>
+            <a:r>
+              <a:rPr lang="de-DE" dirty="0" err="1" smtClean="0"/>
+              <a:t>user</a:t>
+            </a:r>
+            <a:r>
+              <a:rPr lang="de-DE" dirty="0" smtClean="0"/>
+              <a:t> </a:t>
+            </a:r>
+            <a:r>
+              <a:rPr lang="de-DE" dirty="0" err="1" smtClean="0"/>
+              <a:t>hits</a:t>
+            </a:r>
+            <a:r>
+              <a:rPr lang="de-DE" dirty="0" smtClean="0"/>
+              <a:t> </a:t>
+            </a:r>
+            <a:r>
+              <a:rPr lang="de-DE" dirty="0" err="1" smtClean="0"/>
+              <a:t>the</a:t>
+            </a:r>
+            <a:r>
+              <a:rPr lang="de-DE" dirty="0" smtClean="0"/>
+              <a:t> </a:t>
+            </a:r>
+            <a:r>
+              <a:rPr lang="de-DE" dirty="0" err="1" smtClean="0"/>
               <a:t>button</a:t>
             </a:r>
             <a:r>
-              <a:rPr lang="en-US" dirty="0"/>
-              <a:t> = new Button</a:t>
-            </a:r>
-            <a:br>
-              <a:rPr lang="en-US" dirty="0"/>
-            </a:br>
-            <a:r>
-              <a:rPr lang="en-US" dirty="0"/>
-              <a:t>            {</a:t>
-            </a:r>
-            <a:br>
-              <a:rPr lang="en-US" dirty="0"/>
-            </a:br>
-            <a:r>
-              <a:rPr lang="en-US" dirty="0"/>
-              <a:t>                Text = </a:t>
-            </a:r>
-            <a:r>
-              <a:rPr lang="en-US" dirty="0" err="1" smtClean="0"/>
-              <a:t>String.Format</a:t>
-            </a:r>
-            <a:r>
-              <a:rPr lang="en-US" dirty="0" smtClean="0"/>
-              <a:t>("Some Text!")</a:t>
-            </a:r>
-            <a:r>
-              <a:rPr lang="en-US" dirty="0"/>
-              <a:t/>
-            </a:r>
-            <a:br>
-              <a:rPr lang="en-US" dirty="0"/>
-            </a:br>
-            <a:r>
-              <a:rPr lang="en-US" dirty="0"/>
-              <a:t>            };</a:t>
-            </a:r>
-            <a:r>
-              <a:rPr lang="en-US" dirty="0"/>
+              <a:rPr lang="de-DE" dirty="0" smtClean="0"/>
+              <a:t>, </a:t>
+            </a:r>
+            <a:r>
+              <a:rPr lang="de-DE" dirty="0" err="1" smtClean="0"/>
+              <a:t>the</a:t>
+            </a:r>
+            <a:r>
+              <a:rPr lang="de-DE" dirty="0" smtClean="0"/>
               <a:t> </a:t>
             </a:r>
-            <a:endParaRPr lang="en-US" dirty="0" smtClean="0"/>
+            <a:r>
+              <a:rPr lang="de-DE" dirty="0" err="1" smtClean="0"/>
+              <a:t>counter</a:t>
+            </a:r>
+            <a:r>
+              <a:rPr lang="de-DE" dirty="0" smtClean="0"/>
+              <a:t> </a:t>
+            </a:r>
+            <a:r>
+              <a:rPr lang="de-DE" dirty="0" err="1" smtClean="0"/>
+              <a:t>value</a:t>
+            </a:r>
+            <a:r>
+              <a:rPr lang="de-DE" dirty="0" smtClean="0"/>
+              <a:t> </a:t>
+            </a:r>
+            <a:r>
+              <a:rPr lang="de-DE" dirty="0" err="1" smtClean="0"/>
+              <a:t>increased</a:t>
+            </a:r>
+            <a:r>
+              <a:rPr lang="de-DE" dirty="0" smtClean="0"/>
+              <a:t> </a:t>
+            </a:r>
+            <a:r>
+              <a:rPr lang="de-DE" dirty="0" err="1" smtClean="0"/>
+              <a:t>and</a:t>
+            </a:r>
+            <a:r>
+              <a:rPr lang="de-DE" dirty="0" smtClean="0"/>
+              <a:t> </a:t>
+            </a:r>
+            <a:r>
+              <a:rPr lang="de-DE" dirty="0" err="1" smtClean="0"/>
+              <a:t>the</a:t>
+            </a:r>
+            <a:r>
+              <a:rPr lang="de-DE" dirty="0" smtClean="0"/>
+              <a:t> </a:t>
+            </a:r>
+            <a:r>
+              <a:rPr lang="de-DE" dirty="0" err="1" smtClean="0"/>
+              <a:t>current</a:t>
+            </a:r>
+            <a:r>
+              <a:rPr lang="de-DE" dirty="0" smtClean="0"/>
+              <a:t> </a:t>
+            </a:r>
+            <a:r>
+              <a:rPr lang="de-DE" dirty="0" err="1" smtClean="0"/>
+              <a:t>value</a:t>
+            </a:r>
+            <a:r>
+              <a:rPr lang="de-DE" dirty="0" smtClean="0"/>
+              <a:t> </a:t>
+            </a:r>
+            <a:r>
+              <a:rPr lang="de-DE" dirty="0" err="1" smtClean="0"/>
+              <a:t>of</a:t>
+            </a:r>
+            <a:r>
+              <a:rPr lang="de-DE" dirty="0" smtClean="0"/>
+              <a:t> </a:t>
+            </a:r>
+            <a:r>
+              <a:rPr lang="de-DE" dirty="0" err="1" smtClean="0"/>
+              <a:t>the</a:t>
+            </a:r>
+            <a:r>
+              <a:rPr lang="de-DE" dirty="0" smtClean="0"/>
+              <a:t> </a:t>
+            </a:r>
+            <a:r>
+              <a:rPr lang="de-DE" dirty="0" err="1" smtClean="0"/>
+              <a:t>counter</a:t>
+            </a:r>
+            <a:r>
+              <a:rPr lang="de-DE" dirty="0" smtClean="0"/>
+              <a:t> </a:t>
+            </a:r>
+            <a:r>
+              <a:rPr lang="de-DE" dirty="0" err="1" smtClean="0"/>
+              <a:t>is</a:t>
+            </a:r>
+            <a:r>
+              <a:rPr lang="de-DE" dirty="0" smtClean="0"/>
+              <a:t> </a:t>
+            </a:r>
+            <a:r>
+              <a:rPr lang="de-DE" dirty="0" err="1" smtClean="0"/>
+              <a:t>displayed</a:t>
+            </a:r>
+            <a:endParaRPr lang="de-DE" dirty="0"/>
           </a:p>
         </p:txBody>
       </p:sp>
@@ -15128,8 +15510,8 @@
           <a:lstStyle/>
           <a:p>
             <a:r>
-              <a:rPr lang="de-DE" dirty="0" smtClean="0"/>
-              <a:t>Hands-On</a:t>
+              <a:rPr lang="de-DE" dirty="0" err="1" smtClean="0"/>
+              <a:t>ButtonCodePage.cs</a:t>
             </a:r>
             <a:endParaRPr lang="de-DE" dirty="0"/>
           </a:p>
@@ -15138,7 +15520,7 @@
     </p:spTree>
     <p:extLst>
       <p:ext uri="{BB962C8B-B14F-4D97-AF65-F5344CB8AC3E}">
-        <p14:creationId xmlns:p14="http://schemas.microsoft.com/office/powerpoint/2010/main" val="2076902266"/>
+        <p14:creationId xmlns:p14="http://schemas.microsoft.com/office/powerpoint/2010/main" val="938184775"/>
       </p:ext>
     </p:extLst>
   </p:cSld>
@@ -15181,8 +15563,217 @@
           <a:lstStyle/>
           <a:p>
             <a:r>
+              <a:rPr lang="de-DE" dirty="0" smtClean="0"/>
+              <a:t>Check out </a:t>
+            </a:r>
+            <a:r>
               <a:rPr lang="de-DE" dirty="0" err="1" smtClean="0"/>
-              <a:t>ButtonCodePage.cs</a:t>
+              <a:t>the</a:t>
+            </a:r>
+            <a:r>
+              <a:rPr lang="de-DE" dirty="0" smtClean="0"/>
+              <a:t> Hands-On Project</a:t>
+            </a:r>
+            <a:r>
+              <a:rPr lang="de-DE" dirty="0" smtClean="0"/>
+              <a:t>!</a:t>
+            </a:r>
+          </a:p>
+          <a:p>
+            <a:r>
+              <a:rPr lang="de-DE" dirty="0"/>
+              <a:t>https://github.com/JasperBroeker/ePortfolio</a:t>
+            </a:r>
+            <a:endParaRPr lang="de-DE" dirty="0"/>
+          </a:p>
+        </p:txBody>
+      </p:sp>
+      <p:sp>
+        <p:nvSpPr>
+          <p:cNvPr id="3" name="Titel 2"/>
+          <p:cNvSpPr>
+            <a:spLocks noGrp="1"/>
+          </p:cNvSpPr>
+          <p:nvPr>
+            <p:ph type="title"/>
+          </p:nvPr>
+        </p:nvSpPr>
+        <p:spPr/>
+        <p:txBody>
+          <a:bodyPr/>
+          <a:lstStyle/>
+          <a:p>
+            <a:r>
+              <a:rPr lang="de-DE" dirty="0" smtClean="0"/>
+              <a:t>Hands-On</a:t>
+            </a:r>
+            <a:endParaRPr lang="de-DE" dirty="0"/>
+          </a:p>
+        </p:txBody>
+      </p:sp>
+    </p:spTree>
+    <p:extLst>
+      <p:ext uri="{BB962C8B-B14F-4D97-AF65-F5344CB8AC3E}">
+        <p14:creationId xmlns:p14="http://schemas.microsoft.com/office/powerpoint/2010/main" val="2317268262"/>
+      </p:ext>
+    </p:extLst>
+  </p:cSld>
+  <p:clrMapOvr>
+    <a:masterClrMapping/>
+  </p:clrMapOvr>
+</p:sld>
+</file>
+
+<file path=ppt/slides/slide6.xml><?xml version="1.0" encoding="utf-8"?>
+<p:sld xmlns:a="http://schemas.openxmlformats.org/drawingml/2006/main" xmlns:r="http://schemas.openxmlformats.org/officeDocument/2006/relationships" xmlns:p="http://schemas.openxmlformats.org/presentationml/2006/main">
+  <p:cSld>
+    <p:spTree>
+      <p:nvGrpSpPr>
+        <p:cNvPr id="1" name=""/>
+        <p:cNvGrpSpPr/>
+        <p:nvPr/>
+      </p:nvGrpSpPr>
+      <p:grpSpPr>
+        <a:xfrm>
+          <a:off x="0" y="0"/>
+          <a:ext cx="0" cy="0"/>
+          <a:chOff x="0" y="0"/>
+          <a:chExt cx="0" cy="0"/>
+        </a:xfrm>
+      </p:grpSpPr>
+      <p:sp>
+        <p:nvSpPr>
+          <p:cNvPr id="2" name="Inhaltsplatzhalter 1"/>
+          <p:cNvSpPr>
+            <a:spLocks noGrp="1"/>
+          </p:cNvSpPr>
+          <p:nvPr>
+            <p:ph idx="1"/>
+          </p:nvPr>
+        </p:nvSpPr>
+        <p:spPr/>
+        <p:txBody>
+          <a:bodyPr/>
+          <a:lstStyle/>
+          <a:p>
+            <a:r>
+              <a:rPr lang="de-DE" dirty="0" err="1" smtClean="0"/>
+              <a:t>MainActivity.cs</a:t>
+            </a:r>
+            <a:r>
+              <a:rPr lang="de-DE" dirty="0" smtClean="0"/>
+              <a:t> </a:t>
+            </a:r>
+            <a:r>
+              <a:rPr lang="de-DE" dirty="0" smtClean="0">
+                <a:sym typeface="Wingdings" panose="05000000000000000000" pitchFamily="2" charset="2"/>
+              </a:rPr>
+              <a:t> </a:t>
+            </a:r>
+            <a:r>
+              <a:rPr lang="de-DE" dirty="0" err="1" smtClean="0">
+                <a:sym typeface="Wingdings" panose="05000000000000000000" pitchFamily="2" charset="2"/>
+              </a:rPr>
+              <a:t>OnCreate</a:t>
+            </a:r>
+            <a:r>
+              <a:rPr lang="de-DE" dirty="0" smtClean="0">
+                <a:sym typeface="Wingdings" panose="05000000000000000000" pitchFamily="2" charset="2"/>
+              </a:rPr>
+              <a:t> (Bundle </a:t>
+            </a:r>
+            <a:r>
+              <a:rPr lang="de-DE" dirty="0" err="1" smtClean="0">
+                <a:sym typeface="Wingdings" panose="05000000000000000000" pitchFamily="2" charset="2"/>
+              </a:rPr>
+              <a:t>bundle</a:t>
+            </a:r>
+            <a:r>
+              <a:rPr lang="de-DE" dirty="0" smtClean="0">
+                <a:sym typeface="Wingdings" panose="05000000000000000000" pitchFamily="2" charset="2"/>
+              </a:rPr>
+              <a:t>)</a:t>
+            </a:r>
+          </a:p>
+          <a:p>
+            <a:pPr lvl="1"/>
+            <a:r>
+              <a:rPr lang="de-DE" dirty="0" smtClean="0"/>
+              <a:t>Initialize </a:t>
+            </a:r>
+            <a:r>
+              <a:rPr lang="de-DE" dirty="0" err="1" smtClean="0"/>
+              <a:t>your</a:t>
+            </a:r>
+            <a:r>
+              <a:rPr lang="de-DE" dirty="0" smtClean="0"/>
+              <a:t> </a:t>
+            </a:r>
+            <a:r>
+              <a:rPr lang="de-DE" dirty="0" err="1" smtClean="0"/>
+              <a:t>activity</a:t>
+            </a:r>
+            <a:endParaRPr lang="de-DE" dirty="0" smtClean="0"/>
+          </a:p>
+          <a:p>
+            <a:pPr lvl="2"/>
+            <a:r>
+              <a:rPr lang="de-DE" dirty="0" err="1"/>
+              <a:t>base.OnCreate</a:t>
+            </a:r>
+            <a:r>
+              <a:rPr lang="de-DE" dirty="0"/>
+              <a:t>(</a:t>
+            </a:r>
+            <a:r>
+              <a:rPr lang="de-DE" dirty="0" err="1"/>
+              <a:t>bundle</a:t>
+            </a:r>
+            <a:r>
+              <a:rPr lang="de-DE" dirty="0"/>
+              <a:t>); </a:t>
+            </a:r>
+          </a:p>
+          <a:p>
+            <a:pPr lvl="1"/>
+            <a:r>
+              <a:rPr lang="de-DE" dirty="0" smtClean="0"/>
+              <a:t>Initialize </a:t>
+            </a:r>
+            <a:r>
+              <a:rPr lang="de-DE" dirty="0" err="1" smtClean="0"/>
+              <a:t>Xamarins.Forms</a:t>
+            </a:r>
+            <a:r>
+              <a:rPr lang="de-DE" dirty="0" smtClean="0"/>
+              <a:t> </a:t>
+            </a:r>
+          </a:p>
+          <a:p>
+            <a:pPr lvl="2"/>
+            <a:r>
+              <a:rPr lang="de-DE" dirty="0" err="1"/>
+              <a:t>Xamarin.Forms.Forms.Init</a:t>
+            </a:r>
+            <a:r>
+              <a:rPr lang="de-DE" dirty="0"/>
+              <a:t>(</a:t>
+            </a:r>
+            <a:r>
+              <a:rPr lang="de-DE" dirty="0" err="1"/>
+              <a:t>this</a:t>
+            </a:r>
+            <a:r>
+              <a:rPr lang="de-DE" dirty="0"/>
+              <a:t>, </a:t>
+            </a:r>
+            <a:r>
+              <a:rPr lang="de-DE" dirty="0" err="1"/>
+              <a:t>bundle</a:t>
+            </a:r>
+            <a:r>
+              <a:rPr lang="de-DE" dirty="0"/>
+              <a:t>); </a:t>
             </a:r>
             <a:endParaRPr lang="de-DE" dirty="0" smtClean="0"/>
           </a:p>
@@ -15190,6 +15781,314 @@
             <a:pPr lvl="1"/>
             <a:r>
               <a:rPr lang="de-DE" dirty="0" smtClean="0"/>
+              <a:t>Initialize </a:t>
+            </a:r>
+            <a:r>
+              <a:rPr lang="de-DE" dirty="0" err="1" smtClean="0"/>
+              <a:t>your</a:t>
+            </a:r>
+            <a:r>
+              <a:rPr lang="de-DE" dirty="0" smtClean="0"/>
+              <a:t> Android </a:t>
+            </a:r>
+            <a:r>
+              <a:rPr lang="de-DE" dirty="0" err="1" smtClean="0"/>
+              <a:t>Application</a:t>
+            </a:r>
+            <a:endParaRPr lang="de-DE" dirty="0"/>
+          </a:p>
+          <a:p>
+            <a:pPr lvl="2"/>
+            <a:r>
+              <a:rPr lang="de-DE" dirty="0" err="1" smtClean="0"/>
+              <a:t>LoadApplication</a:t>
+            </a:r>
+            <a:r>
+              <a:rPr lang="de-DE" dirty="0" smtClean="0"/>
+              <a:t>(</a:t>
+            </a:r>
+            <a:r>
+              <a:rPr lang="de-DE" dirty="0" err="1" smtClean="0"/>
+              <a:t>new</a:t>
+            </a:r>
+            <a:r>
+              <a:rPr lang="de-DE" dirty="0"/>
+              <a:t> App());</a:t>
+            </a:r>
+            <a:br>
+              <a:rPr lang="de-DE" dirty="0"/>
+            </a:br>
+            <a:endParaRPr lang="de-DE" dirty="0" smtClean="0"/>
+          </a:p>
+          <a:p>
+            <a:pPr lvl="1"/>
+            <a:endParaRPr lang="de-DE" dirty="0"/>
+          </a:p>
+        </p:txBody>
+      </p:sp>
+      <p:sp>
+        <p:nvSpPr>
+          <p:cNvPr id="3" name="Titel 2"/>
+          <p:cNvSpPr>
+            <a:spLocks noGrp="1"/>
+          </p:cNvSpPr>
+          <p:nvPr>
+            <p:ph type="title"/>
+          </p:nvPr>
+        </p:nvSpPr>
+        <p:spPr/>
+        <p:txBody>
+          <a:bodyPr/>
+          <a:lstStyle/>
+          <a:p>
+            <a:r>
+              <a:rPr lang="de-DE" dirty="0" smtClean="0"/>
+              <a:t>Hands-On</a:t>
+            </a:r>
+            <a:endParaRPr lang="de-DE" dirty="0"/>
+          </a:p>
+        </p:txBody>
+      </p:sp>
+    </p:spTree>
+    <p:extLst>
+      <p:ext uri="{BB962C8B-B14F-4D97-AF65-F5344CB8AC3E}">
+        <p14:creationId xmlns:p14="http://schemas.microsoft.com/office/powerpoint/2010/main" val="3757485771"/>
+      </p:ext>
+    </p:extLst>
+  </p:cSld>
+  <p:clrMapOvr>
+    <a:masterClrMapping/>
+  </p:clrMapOvr>
+</p:sld>
+</file>
+
+<file path=ppt/slides/slide7.xml><?xml version="1.0" encoding="utf-8"?>
+<p:sld xmlns:a="http://schemas.openxmlformats.org/drawingml/2006/main" xmlns:r="http://schemas.openxmlformats.org/officeDocument/2006/relationships" xmlns:p="http://schemas.openxmlformats.org/presentationml/2006/main">
+  <p:cSld>
+    <p:spTree>
+      <p:nvGrpSpPr>
+        <p:cNvPr id="1" name=""/>
+        <p:cNvGrpSpPr/>
+        <p:nvPr/>
+      </p:nvGrpSpPr>
+      <p:grpSpPr>
+        <a:xfrm>
+          <a:off x="0" y="0"/>
+          <a:ext cx="0" cy="0"/>
+          <a:chOff x="0" y="0"/>
+          <a:chExt cx="0" cy="0"/>
+        </a:xfrm>
+      </p:grpSpPr>
+      <p:sp>
+        <p:nvSpPr>
+          <p:cNvPr id="2" name="Inhaltsplatzhalter 1"/>
+          <p:cNvSpPr>
+            <a:spLocks noGrp="1"/>
+          </p:cNvSpPr>
+          <p:nvPr>
+            <p:ph idx="1"/>
+          </p:nvPr>
+        </p:nvSpPr>
+        <p:spPr/>
+        <p:txBody>
+          <a:bodyPr/>
+          <a:lstStyle/>
+          <a:p>
+            <a:r>
+              <a:rPr lang="de-DE" dirty="0" err="1" smtClean="0"/>
+              <a:t>ButtonCodePage.cs</a:t>
+            </a:r>
+            <a:endParaRPr lang="de-DE" dirty="0" smtClean="0"/>
+          </a:p>
+          <a:p>
+            <a:pPr lvl="1"/>
+            <a:r>
+              <a:rPr lang="de-DE" dirty="0" smtClean="0"/>
+              <a:t>Create a Button </a:t>
+            </a:r>
+            <a:r>
+              <a:rPr lang="de-DE" dirty="0" err="1" smtClean="0"/>
+              <a:t>which</a:t>
+            </a:r>
+            <a:r>
+              <a:rPr lang="de-DE" dirty="0" smtClean="0"/>
+              <a:t> in </a:t>
+            </a:r>
+            <a:r>
+              <a:rPr lang="de-DE" dirty="0" err="1" smtClean="0"/>
+              <a:t>the</a:t>
+            </a:r>
+            <a:r>
+              <a:rPr lang="de-DE" dirty="0" smtClean="0"/>
+              <a:t> </a:t>
+            </a:r>
+            <a:r>
+              <a:rPr lang="de-DE" dirty="0" err="1" smtClean="0"/>
+              <a:t>next</a:t>
+            </a:r>
+            <a:r>
+              <a:rPr lang="de-DE" dirty="0" smtClean="0"/>
+              <a:t> </a:t>
+            </a:r>
+            <a:r>
+              <a:rPr lang="de-DE" dirty="0" err="1" smtClean="0"/>
+              <a:t>step</a:t>
+            </a:r>
+            <a:r>
+              <a:rPr lang="de-DE" dirty="0" smtClean="0"/>
+              <a:t> </a:t>
+            </a:r>
+            <a:r>
+              <a:rPr lang="de-DE" dirty="0" err="1" smtClean="0"/>
+              <a:t>gets</a:t>
+            </a:r>
+            <a:r>
+              <a:rPr lang="de-DE" dirty="0" smtClean="0"/>
+              <a:t> a </a:t>
+            </a:r>
+            <a:r>
+              <a:rPr lang="de-DE" dirty="0" err="1" smtClean="0"/>
+              <a:t>click</a:t>
+            </a:r>
+            <a:r>
+              <a:rPr lang="de-DE" dirty="0" smtClean="0"/>
+              <a:t> </a:t>
+            </a:r>
+            <a:r>
+              <a:rPr lang="de-DE" dirty="0" err="1" smtClean="0"/>
+              <a:t>event</a:t>
+            </a:r>
+            <a:endParaRPr lang="de-DE" dirty="0" smtClean="0"/>
+          </a:p>
+          <a:p>
+            <a:pPr lvl="2"/>
+            <a:r>
+              <a:rPr lang="en-US" dirty="0"/>
+              <a:t> Button </a:t>
+            </a:r>
+            <a:r>
+              <a:rPr lang="en-US" dirty="0" err="1"/>
+              <a:t>button</a:t>
+            </a:r>
+            <a:r>
+              <a:rPr lang="en-US" dirty="0"/>
+              <a:t> = new Button</a:t>
+            </a:r>
+            <a:br>
+              <a:rPr lang="en-US" dirty="0"/>
+            </a:br>
+            <a:r>
+              <a:rPr lang="en-US" dirty="0"/>
+              <a:t>            {</a:t>
+            </a:r>
+            <a:br>
+              <a:rPr lang="en-US" dirty="0"/>
+            </a:br>
+            <a:r>
+              <a:rPr lang="en-US" dirty="0"/>
+              <a:t>                Text = </a:t>
+            </a:r>
+            <a:r>
+              <a:rPr lang="en-US" dirty="0" err="1" smtClean="0"/>
+              <a:t>String.Format</a:t>
+            </a:r>
+            <a:r>
+              <a:rPr lang="en-US" dirty="0" smtClean="0"/>
+              <a:t>("Some Text!")</a:t>
+            </a:r>
+            <a:r>
+              <a:rPr lang="en-US" dirty="0"/>
+              <a:t/>
+            </a:r>
+            <a:br>
+              <a:rPr lang="en-US" dirty="0"/>
+            </a:br>
+            <a:r>
+              <a:rPr lang="en-US" dirty="0"/>
+              <a:t>            }; </a:t>
+            </a:r>
+            <a:endParaRPr lang="en-US" dirty="0" smtClean="0"/>
+          </a:p>
+        </p:txBody>
+      </p:sp>
+      <p:sp>
+        <p:nvSpPr>
+          <p:cNvPr id="3" name="Titel 2"/>
+          <p:cNvSpPr>
+            <a:spLocks noGrp="1"/>
+          </p:cNvSpPr>
+          <p:nvPr>
+            <p:ph type="title"/>
+          </p:nvPr>
+        </p:nvSpPr>
+        <p:spPr/>
+        <p:txBody>
+          <a:bodyPr/>
+          <a:lstStyle/>
+          <a:p>
+            <a:r>
+              <a:rPr lang="de-DE" dirty="0" smtClean="0"/>
+              <a:t>Hands-On</a:t>
+            </a:r>
+            <a:endParaRPr lang="de-DE" dirty="0"/>
+          </a:p>
+        </p:txBody>
+      </p:sp>
+    </p:spTree>
+    <p:extLst>
+      <p:ext uri="{BB962C8B-B14F-4D97-AF65-F5344CB8AC3E}">
+        <p14:creationId xmlns:p14="http://schemas.microsoft.com/office/powerpoint/2010/main" val="2076902266"/>
+      </p:ext>
+    </p:extLst>
+  </p:cSld>
+  <p:clrMapOvr>
+    <a:masterClrMapping/>
+  </p:clrMapOvr>
+</p:sld>
+</file>
+
+<file path=ppt/slides/slide8.xml><?xml version="1.0" encoding="utf-8"?>
+<p:sld xmlns:a="http://schemas.openxmlformats.org/drawingml/2006/main" xmlns:r="http://schemas.openxmlformats.org/officeDocument/2006/relationships" xmlns:p="http://schemas.openxmlformats.org/presentationml/2006/main">
+  <p:cSld>
+    <p:spTree>
+      <p:nvGrpSpPr>
+        <p:cNvPr id="1" name=""/>
+        <p:cNvGrpSpPr/>
+        <p:nvPr/>
+      </p:nvGrpSpPr>
+      <p:grpSpPr>
+        <a:xfrm>
+          <a:off x="0" y="0"/>
+          <a:ext cx="0" cy="0"/>
+          <a:chOff x="0" y="0"/>
+          <a:chExt cx="0" cy="0"/>
+        </a:xfrm>
+      </p:grpSpPr>
+      <p:sp>
+        <p:nvSpPr>
+          <p:cNvPr id="2" name="Inhaltsplatzhalter 1"/>
+          <p:cNvSpPr>
+            <a:spLocks noGrp="1"/>
+          </p:cNvSpPr>
+          <p:nvPr>
+            <p:ph idx="1"/>
+          </p:nvPr>
+        </p:nvSpPr>
+        <p:spPr/>
+        <p:txBody>
+          <a:bodyPr/>
+          <a:lstStyle/>
+          <a:p>
+            <a:r>
+              <a:rPr lang="de-DE" dirty="0" err="1" smtClean="0"/>
+              <a:t>ButtonCodePage.cs</a:t>
+            </a:r>
+            <a:endParaRPr lang="de-DE" dirty="0" smtClean="0"/>
+          </a:p>
+          <a:p>
+            <a:pPr lvl="1"/>
+            <a:r>
+              <a:rPr lang="de-DE" dirty="0" smtClean="0"/>
               <a:t>Button Click Event </a:t>
             </a:r>
             <a:r>
@@ -15372,11 +16271,7 @@
             </a:r>
             <a:r>
               <a:rPr lang="en-US" dirty="0"/>
-              <a:t>("{0} click{1}!", count, count == 1 ? "" : "s");</a:t>
-            </a:r>
-            <a:r>
-              <a:rPr lang="en-US" dirty="0"/>
-              <a:t> </a:t>
+              <a:t>("{0} click{1}!", count, count == 1 ? "" : "s"); </a:t>
             </a:r>
             <a:endParaRPr lang="de-DE" dirty="0"/>
           </a:p>

</xml_diff>